<commit_message>
add R2 score output and update project links in documentation
</commit_message>
<xml_diff>
--- a/food_waste_prediction_system.pptx
+++ b/food_waste_prediction_system.pptx
@@ -277,7 +277,7 @@
       </p15:sldGuideLst>
     </p:ext>
     <p:ext uri="http://customooxmlschemas.google.com/">
-      <go:slidesCustomData xmlns="" xmlns:go="http://customooxmlschemas.google.com/" xmlns:p15="http://schemas.microsoft.com/office/powerpoint/2012/main" xmlns:p14="http://schemas.microsoft.com/office/powerpoint/2010/main" xmlns:com="http://schemas.openxmlformats.org/drawingml/2006/compatibility" xmlns:pvml="urn:schemas-microsoft-com:office:powerpoint" xmlns:v="urn:schemas-microsoft-com:vml" xmlns:o="urn:schemas-microsoft-com:office:office" xmlns:dgm="http://schemas.openxmlformats.org/drawingml/2006/diagram" xmlns:c="http://schemas.openxmlformats.org/drawingml/2006/chart" xmlns:mv="urn:schemas-microsoft-com:mac:vml" xmlns:mc="http://schemas.openxmlformats.org/markup-compatibility/2006" r:id="rId220" roundtripDataSignature="AMtx7miWNY2LB4ETJwrL8F0N+EK9hEhqUQ=="/>
+      <go:slidesCustomData xmlns:mc="http://schemas.openxmlformats.org/markup-compatibility/2006" xmlns:mv="urn:schemas-microsoft-com:mac:vml" xmlns:c="http://schemas.openxmlformats.org/drawingml/2006/chart" xmlns:dgm="http://schemas.openxmlformats.org/drawingml/2006/diagram" xmlns:o="urn:schemas-microsoft-com:office:office" xmlns:v="urn:schemas-microsoft-com:vml" xmlns:pvml="urn:schemas-microsoft-com:office:powerpoint" xmlns:com="http://schemas.openxmlformats.org/drawingml/2006/compatibility" xmlns:p14="http://schemas.microsoft.com/office/powerpoint/2010/main" xmlns:p15="http://schemas.microsoft.com/office/powerpoint/2012/main" xmlns:go="http://customooxmlschemas.google.com/" xmlns="" r:id="rId220" roundtripDataSignature="AMtx7miWNY2LB4ETJwrL8F0N+EK9hEhqUQ=="/>
     </p:ext>
   </p:extLst>
 </p:presentation>
@@ -286,7 +286,7 @@
 <file path=ppt/revisionInfo.xml><?xml version="1.0" encoding="utf-8"?>
 <p1510:revInfo xmlns:a="http://schemas.openxmlformats.org/drawingml/2006/main" xmlns:r="http://schemas.openxmlformats.org/officeDocument/2006/relationships" xmlns:p1510="http://schemas.microsoft.com/office/powerpoint/2015/10/main">
   <p1510:revLst>
-    <p1510:client id="{975EB630-E21A-4BB2-BE55-F314667820FB}" v="9" dt="2026-01-14T07:16:43.535"/>
+    <p1510:client id="{975EB630-E21A-4BB2-BE55-F314667820FB}" v="14" dt="2026-01-14T09:22:34.763"/>
   </p1510:revLst>
 </p1510:revInfo>
 </file>
@@ -296,7 +296,7 @@
   <pc:docChgLst>
     <pc:chgData name="Kumar Dhobale" userId="88cf7e8cdccd29d8" providerId="LiveId" clId="{7D54C613-B645-4F65-B2F8-8DA52939A8BE}"/>
     <pc:docChg chg="custSel addSld modSld sldOrd">
-      <pc:chgData name="Kumar Dhobale" userId="88cf7e8cdccd29d8" providerId="LiveId" clId="{7D54C613-B645-4F65-B2F8-8DA52939A8BE}" dt="2026-01-14T07:16:44.552" v="82" actId="20577"/>
+      <pc:chgData name="Kumar Dhobale" userId="88cf7e8cdccd29d8" providerId="LiveId" clId="{7D54C613-B645-4F65-B2F8-8DA52939A8BE}" dt="2026-01-14T09:22:36.139" v="114" actId="20577"/>
       <pc:docMkLst>
         <pc:docMk/>
       </pc:docMkLst>
@@ -323,13 +323,13 @@
         </pc:spChg>
       </pc:sldChg>
       <pc:sldChg chg="addSp modSp add mod ord">
-        <pc:chgData name="Kumar Dhobale" userId="88cf7e8cdccd29d8" providerId="LiveId" clId="{7D54C613-B645-4F65-B2F8-8DA52939A8BE}" dt="2026-01-14T07:16:44.552" v="82" actId="20577"/>
+        <pc:chgData name="Kumar Dhobale" userId="88cf7e8cdccd29d8" providerId="LiveId" clId="{7D54C613-B645-4F65-B2F8-8DA52939A8BE}" dt="2026-01-14T09:22:36.139" v="114" actId="20577"/>
         <pc:sldMkLst>
           <pc:docMk/>
           <pc:sldMk cId="1984430202" sldId="1359"/>
         </pc:sldMkLst>
         <pc:spChg chg="add mod">
-          <ac:chgData name="Kumar Dhobale" userId="88cf7e8cdccd29d8" providerId="LiveId" clId="{7D54C613-B645-4F65-B2F8-8DA52939A8BE}" dt="2026-01-14T07:16:44.552" v="82" actId="20577"/>
+          <ac:chgData name="Kumar Dhobale" userId="88cf7e8cdccd29d8" providerId="LiveId" clId="{7D54C613-B645-4F65-B2F8-8DA52939A8BE}" dt="2026-01-14T09:22:36.139" v="114" actId="20577"/>
           <ac:spMkLst>
             <pc:docMk/>
             <pc:sldMk cId="1984430202" sldId="1359"/>
@@ -5996,8 +5996,8 @@
         </p:nvSpPr>
         <p:spPr>
           <a:xfrm>
-            <a:off x="386080" y="1198880"/>
-            <a:ext cx="11216640" cy="1528945"/>
+            <a:off x="558800" y="1422400"/>
+            <a:ext cx="11216640" cy="2103589"/>
           </a:xfrm>
           <a:prstGeom prst="rect">
             <a:avLst/>
@@ -6040,7 +6040,7 @@
             </a:pPr>
             <a:r>
               <a:rPr lang="en-IN" dirty="0" err="1"/>
-              <a:t>Github</a:t>
+              <a:t>github</a:t>
             </a:r>
             <a:r>
               <a:rPr lang="en-IN" dirty="0"/>
@@ -6051,6 +6051,30 @@
                 <a:hlinkClick r:id="rId4"/>
               </a:rPr>
               <a:t>https://github.com/KumarDhobale/food_waste_prediction_system</a:t>
+            </a:r>
+            <a:endParaRPr lang="en-IN" dirty="0"/>
+          </a:p>
+          <a:p>
+            <a:pPr marL="342900" indent="-342900">
+              <a:buFont typeface="Arial" panose="020B0604020202020204" pitchFamily="34" charset="0"/>
+              <a:buChar char="•"/>
+            </a:pPr>
+            <a:endParaRPr lang="en-IN" dirty="0"/>
+          </a:p>
+          <a:p>
+            <a:pPr marL="342900" indent="-342900">
+              <a:buFont typeface="Arial" panose="020B0604020202020204" pitchFamily="34" charset="0"/>
+              <a:buChar char="•"/>
+            </a:pPr>
+            <a:r>
+              <a:rPr lang="en-IN" dirty="0"/>
+              <a:t>Project live link: </a:t>
+            </a:r>
+            <a:r>
+              <a:rPr lang="en-IN" dirty="0">
+                <a:hlinkClick r:id="rId5"/>
+              </a:rPr>
+              <a:t>https://foodwastepredictionsystem-2i4fd6jmvau8kfo8ogprw5.streamlit.app</a:t>
             </a:r>
             <a:endParaRPr lang="en-IN" dirty="0"/>
           </a:p>
@@ -9895,15 +9919,6 @@
 </file>
 
 <file path=customXml/item1.xml><?xml version="1.0" encoding="utf-8"?>
-<?mso-contentType ?>
-<FormTemplates xmlns="http://schemas.microsoft.com/sharepoint/v3/contenttype/forms">
-  <Display>DocumentLibraryForm</Display>
-  <Edit>DocumentLibraryForm</Edit>
-  <New>DocumentLibraryForm</New>
-</FormTemplates>
-</file>
-
-<file path=customXml/item2.xml><?xml version="1.0" encoding="utf-8"?>
 <ct:contentTypeSchema xmlns:ct="http://schemas.microsoft.com/office/2006/metadata/contentType" xmlns:ma="http://schemas.microsoft.com/office/2006/metadata/properties/metaAttributes" ct:_="" ma:_="" ma:contentTypeName="Document" ma:contentTypeID="0x0101000F1872188ABCFC48BECA6C87E8AC3285" ma:contentTypeVersion="15" ma:contentTypeDescription="Create a new document." ma:contentTypeScope="" ma:versionID="7670618c03e54fbae4a17ecb2d0ed10f">
   <xsd:schema xmlns:xsd="http://www.w3.org/2001/XMLSchema" xmlns:xs="http://www.w3.org/2001/XMLSchema" xmlns:p="http://schemas.microsoft.com/office/2006/metadata/properties" xmlns:ns3="9162bd5b-4ed9-4da3-b376-05204580ba3f" xmlns:ns4="c0fa2617-96bd-425d-8578-e93563fe37c5" targetNamespace="http://schemas.microsoft.com/office/2006/metadata/properties" ma:root="true" ma:fieldsID="3d63de1c5a217044e31e0c8b260d3d71" ns3:_="" ns4:_="">
     <xsd:import namespace="9162bd5b-4ed9-4da3-b376-05204580ba3f"/>
@@ -10138,6 +10153,15 @@
 </ct:contentTypeSchema>
 </file>
 
+<file path=customXml/item2.xml><?xml version="1.0" encoding="utf-8"?>
+<?mso-contentType ?>
+<FormTemplates xmlns="http://schemas.microsoft.com/sharepoint/v3/contenttype/forms">
+  <Display>DocumentLibraryForm</Display>
+  <Edit>DocumentLibraryForm</Edit>
+  <New>DocumentLibraryForm</New>
+</FormTemplates>
+</file>
+
 <file path=customXml/item3.xml><?xml version="1.0" encoding="utf-8"?>
 <p:properties xmlns:p="http://schemas.microsoft.com/office/2006/metadata/properties" xmlns:xsi="http://www.w3.org/2001/XMLSchema-instance" xmlns:pc="http://schemas.microsoft.com/office/infopath/2007/PartnerControls">
   <documentManagement>
@@ -10147,14 +10171,6 @@
 </file>
 
 <file path=customXml/itemProps1.xml><?xml version="1.0" encoding="utf-8"?>
-<ds:datastoreItem xmlns:ds="http://schemas.openxmlformats.org/officeDocument/2006/customXml" ds:itemID="{3706AB80-2608-47D7-8AC8-FA6BC8A9B27C}">
-  <ds:schemaRefs>
-    <ds:schemaRef ds:uri="http://schemas.microsoft.com/sharepoint/v3/contenttype/forms"/>
-  </ds:schemaRefs>
-</ds:datastoreItem>
-</file>
-
-<file path=customXml/itemProps2.xml><?xml version="1.0" encoding="utf-8"?>
 <ds:datastoreItem xmlns:ds="http://schemas.openxmlformats.org/officeDocument/2006/customXml" ds:itemID="{7D9E5D5E-A365-4A49-8140-C8CC82A61608}">
   <ds:schemaRefs>
     <ds:schemaRef ds:uri="9162bd5b-4ed9-4da3-b376-05204580ba3f"/>
@@ -10169,6 +10185,14 @@
     <ds:schemaRef ds:uri="http://schemas.microsoft.com/office/infopath/2007/PartnerControls"/>
     <ds:schemaRef ds:uri="http://schemas.openxmlformats.org/package/2006/metadata/core-properties"/>
     <ds:schemaRef ds:uri="http://www.w3.org/2001/XMLSchema"/>
+  </ds:schemaRefs>
+</ds:datastoreItem>
+</file>
+
+<file path=customXml/itemProps2.xml><?xml version="1.0" encoding="utf-8"?>
+<ds:datastoreItem xmlns:ds="http://schemas.openxmlformats.org/officeDocument/2006/customXml" ds:itemID="{3706AB80-2608-47D7-8AC8-FA6BC8A9B27C}">
+  <ds:schemaRefs>
+    <ds:schemaRef ds:uri="http://schemas.microsoft.com/sharepoint/v3/contenttype/forms"/>
   </ds:schemaRefs>
 </ds:datastoreItem>
 </file>

</xml_diff>